<commit_message>
Character movement working with animations
</commit_message>
<xml_diff>
--- a/Outreach Game Feel.pptx
+++ b/Outreach Game Feel.pptx
@@ -208,7 +208,7 @@
           <a:p>
             <a:fld id="{3522FA00-914B-D048-9851-104E7310B307}" type="datetimeFigureOut">
               <a:rPr lang="en-US" smtClean="0"/>
-              <a:t>2/12/2024</a:t>
+              <a:t>2/13/2024</a:t>
             </a:fld>
             <a:endParaRPr lang="en-US"/>
           </a:p>
@@ -864,7 +864,7 @@
             <a:fld id="{AB946FCE-CD33-40F3-99C8-62083596779E}" type="datetime4">
               <a:rPr lang="en-GB" smtClean="0"/>
               <a:pPr/>
-              <a:t>12 February 2024</a:t>
+              <a:t>13 February 2024</a:t>
             </a:fld>
             <a:endParaRPr lang="en-GB" dirty="0"/>
           </a:p>
@@ -6058,7 +6058,7 @@
             <a:fld id="{AB946FCE-CD33-40F3-99C8-62083596779E}" type="datetime4">
               <a:rPr lang="en-GB" smtClean="0"/>
               <a:pPr/>
-              <a:t>12 February 2024</a:t>
+              <a:t>13 February 2024</a:t>
             </a:fld>
             <a:endParaRPr lang="en-GB" dirty="0"/>
           </a:p>
@@ -12835,7 +12835,7 @@
             <a:fld id="{AB946FCE-CD33-40F3-99C8-62083596779E}" type="datetime4">
               <a:rPr lang="en-GB" smtClean="0"/>
               <a:pPr/>
-              <a:t>12 February 2024</a:t>
+              <a:t>13 February 2024</a:t>
             </a:fld>
             <a:endParaRPr lang="en-GB" dirty="0"/>
           </a:p>
@@ -13559,7 +13559,7 @@
           <a:p>
             <a:fld id="{EAB3C052-D9C3-483C-9BE1-4EA46150CF35}" type="datetimeFigureOut">
               <a:rPr lang="en-US" smtClean="0"/>
-              <a:t>2/12/2024</a:t>
+              <a:t>2/13/2024</a:t>
             </a:fld>
             <a:endParaRPr lang="en-US"/>
           </a:p>
@@ -14682,7 +14682,7 @@
             <a:fld id="{AB946FCE-CD33-40F3-99C8-62083596779E}" type="datetime4">
               <a:rPr lang="en-GB" smtClean="0"/>
               <a:pPr/>
-              <a:t>12 February 2024</a:t>
+              <a:t>13 February 2024</a:t>
             </a:fld>
             <a:endParaRPr lang="en-GB" dirty="0"/>
           </a:p>
@@ -14884,7 +14884,7 @@
             <a:fld id="{AB946FCE-CD33-40F3-99C8-62083596779E}" type="datetime4">
               <a:rPr lang="en-GB" smtClean="0"/>
               <a:pPr/>
-              <a:t>12 February 2024</a:t>
+              <a:t>13 February 2024</a:t>
             </a:fld>
             <a:endParaRPr lang="en-GB" dirty="0"/>
           </a:p>
@@ -15086,7 +15086,7 @@
             <a:fld id="{AB946FCE-CD33-40F3-99C8-62083596779E}" type="datetime4">
               <a:rPr lang="en-GB" smtClean="0"/>
               <a:pPr/>
-              <a:t>12 February 2024</a:t>
+              <a:t>13 February 2024</a:t>
             </a:fld>
             <a:endParaRPr lang="en-GB" dirty="0"/>
           </a:p>
@@ -15288,7 +15288,7 @@
             <a:fld id="{AB946FCE-CD33-40F3-99C8-62083596779E}" type="datetime4">
               <a:rPr lang="en-GB" smtClean="0"/>
               <a:pPr/>
-              <a:t>12 February 2024</a:t>
+              <a:t>13 February 2024</a:t>
             </a:fld>
             <a:endParaRPr lang="en-GB" dirty="0"/>
           </a:p>
@@ -17404,7 +17404,7 @@
               <a:rPr lang="en-GB" dirty="0">
                 <a:cs typeface="Arial"/>
               </a:rPr>
-              <a:t>Game Feel is yes</a:t>
+              <a:t>Game Feel is </a:t>
             </a:r>
           </a:p>
         </p:txBody>
@@ -18156,14 +18156,6 @@
 </file>
 
 <file path=customXml/item2.xml><?xml version="1.0" encoding="utf-8"?>
-<p:properties xmlns:p="http://schemas.microsoft.com/office/2006/metadata/properties" xmlns:xsi="http://www.w3.org/2001/XMLSchema-instance" xmlns:pc="http://schemas.microsoft.com/office/infopath/2007/PartnerControls">
-  <documentManagement>
-    <_activity xmlns="35048947-678a-46a0-ab50-be65e2959368" xsi:nil="true"/>
-  </documentManagement>
-</p:properties>
-</file>
-
-<file path=customXml/item3.xml><?xml version="1.0" encoding="utf-8"?>
 <ct:contentTypeSchema xmlns:ct="http://schemas.microsoft.com/office/2006/metadata/contentType" xmlns:ma="http://schemas.microsoft.com/office/2006/metadata/properties/metaAttributes" ct:_="" ma:_="" ma:contentTypeName="Document" ma:contentTypeID="0x010100FDA901102487C047B313EE23022CB014" ma:contentTypeVersion="15" ma:contentTypeDescription="Create a new document." ma:contentTypeScope="" ma:versionID="59c3c0acbefcc0d5acd8ccabb0dfcf4f">
   <xsd:schema xmlns:xsd="http://www.w3.org/2001/XMLSchema" xmlns:xs="http://www.w3.org/2001/XMLSchema" xmlns:p="http://schemas.microsoft.com/office/2006/metadata/properties" xmlns:ns3="0cfb6610-8404-40d7-8f97-a3f8b88ab51b" xmlns:ns4="35048947-678a-46a0-ab50-be65e2959368" targetNamespace="http://schemas.microsoft.com/office/2006/metadata/properties" ma:root="true" ma:fieldsID="dcdc4a2cbdd8a8df40a57088b7c4c384" ns3:_="" ns4:_="">
     <xsd:import namespace="0cfb6610-8404-40d7-8f97-a3f8b88ab51b"/>
@@ -18398,6 +18390,14 @@
 </ct:contentTypeSchema>
 </file>
 
+<file path=customXml/item3.xml><?xml version="1.0" encoding="utf-8"?>
+<p:properties xmlns:p="http://schemas.microsoft.com/office/2006/metadata/properties" xmlns:xsi="http://www.w3.org/2001/XMLSchema-instance" xmlns:pc="http://schemas.microsoft.com/office/infopath/2007/PartnerControls">
+  <documentManagement>
+    <_activity xmlns="35048947-678a-46a0-ab50-be65e2959368" xsi:nil="true"/>
+  </documentManagement>
+</p:properties>
+</file>
+
 <file path=customXml/itemProps1.xml><?xml version="1.0" encoding="utf-8"?>
 <ds:datastoreItem xmlns:ds="http://schemas.openxmlformats.org/officeDocument/2006/customXml" ds:itemID="{04660D31-497D-4012-B9D4-27661138BB00}">
   <ds:schemaRefs>
@@ -18407,23 +18407,6 @@
 </file>
 
 <file path=customXml/itemProps2.xml><?xml version="1.0" encoding="utf-8"?>
-<ds:datastoreItem xmlns:ds="http://schemas.openxmlformats.org/officeDocument/2006/customXml" ds:itemID="{FAB19F44-9C41-4A3E-A535-0A294B58A0C9}">
-  <ds:schemaRefs>
-    <ds:schemaRef ds:uri="http://purl.org/dc/terms/"/>
-    <ds:schemaRef ds:uri="http://schemas.microsoft.com/office/infopath/2007/PartnerControls"/>
-    <ds:schemaRef ds:uri="0cfb6610-8404-40d7-8f97-a3f8b88ab51b"/>
-    <ds:schemaRef ds:uri="http://www.w3.org/XML/1998/namespace"/>
-    <ds:schemaRef ds:uri="http://schemas.microsoft.com/office/2006/metadata/properties"/>
-    <ds:schemaRef ds:uri="http://schemas.microsoft.com/office/2006/documentManagement/types"/>
-    <ds:schemaRef ds:uri="http://purl.org/dc/elements/1.1/"/>
-    <ds:schemaRef ds:uri="http://schemas.openxmlformats.org/package/2006/metadata/core-properties"/>
-    <ds:schemaRef ds:uri="35048947-678a-46a0-ab50-be65e2959368"/>
-    <ds:schemaRef ds:uri="http://purl.org/dc/dcmitype/"/>
-  </ds:schemaRefs>
-</ds:datastoreItem>
-</file>
-
-<file path=customXml/itemProps3.xml><?xml version="1.0" encoding="utf-8"?>
 <ds:datastoreItem xmlns:ds="http://schemas.openxmlformats.org/officeDocument/2006/customXml" ds:itemID="{3BA5C9EA-51AD-47DE-92F9-EEF859C251FF}">
   <ds:schemaRefs>
     <ds:schemaRef ds:uri="http://schemas.microsoft.com/office/2006/metadata/contentType"/>
@@ -18440,4 +18423,21 @@
     <ds:schemaRef ds:uri="http://schemas.microsoft.com/internal/obd"/>
   </ds:schemaRefs>
 </ds:datastoreItem>
+</file>
+
+<file path=customXml/itemProps3.xml><?xml version="1.0" encoding="utf-8"?>
+<ds:datastoreItem xmlns:ds="http://schemas.openxmlformats.org/officeDocument/2006/customXml" ds:itemID="{FAB19F44-9C41-4A3E-A535-0A294B58A0C9}">
+  <ds:schemaRefs>
+    <ds:schemaRef ds:uri="http://purl.org/dc/terms/"/>
+    <ds:schemaRef ds:uri="http://schemas.microsoft.com/office/infopath/2007/PartnerControls"/>
+    <ds:schemaRef ds:uri="0cfb6610-8404-40d7-8f97-a3f8b88ab51b"/>
+    <ds:schemaRef ds:uri="http://www.w3.org/XML/1998/namespace"/>
+    <ds:schemaRef ds:uri="http://schemas.microsoft.com/office/2006/metadata/properties"/>
+    <ds:schemaRef ds:uri="http://schemas.microsoft.com/office/2006/documentManagement/types"/>
+    <ds:schemaRef ds:uri="http://purl.org/dc/elements/1.1/"/>
+    <ds:schemaRef ds:uri="http://schemas.openxmlformats.org/package/2006/metadata/core-properties"/>
+    <ds:schemaRef ds:uri="35048947-678a-46a0-ab50-be65e2959368"/>
+    <ds:schemaRef ds:uri="http://purl.org/dc/dcmitype/"/>
+  </ds:schemaRefs>
+</ds:datastoreItem>
 </file>
</xml_diff>